<commit_message>
Updating the readme again
</commit_message>
<xml_diff>
--- a/Architecture.pptx
+++ b/Architecture.pptx
@@ -261,7 +261,7 @@
           <a:p>
             <a:fld id="{417597D8-38D3-4DD5-B14D-D63E9CCB29F9}" type="datetimeFigureOut">
               <a:rPr lang="en-US" smtClean="0"/>
-              <a:t>1/15/2021</a:t>
+              <a:t>1/16/2021</a:t>
             </a:fld>
             <a:endParaRPr lang="en-US"/>
           </a:p>
@@ -459,7 +459,7 @@
           <a:p>
             <a:fld id="{417597D8-38D3-4DD5-B14D-D63E9CCB29F9}" type="datetimeFigureOut">
               <a:rPr lang="en-US" smtClean="0"/>
-              <a:t>1/15/2021</a:t>
+              <a:t>1/16/2021</a:t>
             </a:fld>
             <a:endParaRPr lang="en-US"/>
           </a:p>
@@ -667,7 +667,7 @@
           <a:p>
             <a:fld id="{417597D8-38D3-4DD5-B14D-D63E9CCB29F9}" type="datetimeFigureOut">
               <a:rPr lang="en-US" smtClean="0"/>
-              <a:t>1/15/2021</a:t>
+              <a:t>1/16/2021</a:t>
             </a:fld>
             <a:endParaRPr lang="en-US"/>
           </a:p>
@@ -865,7 +865,7 @@
           <a:p>
             <a:fld id="{417597D8-38D3-4DD5-B14D-D63E9CCB29F9}" type="datetimeFigureOut">
               <a:rPr lang="en-US" smtClean="0"/>
-              <a:t>1/15/2021</a:t>
+              <a:t>1/16/2021</a:t>
             </a:fld>
             <a:endParaRPr lang="en-US"/>
           </a:p>
@@ -1140,7 +1140,7 @@
           <a:p>
             <a:fld id="{417597D8-38D3-4DD5-B14D-D63E9CCB29F9}" type="datetimeFigureOut">
               <a:rPr lang="en-US" smtClean="0"/>
-              <a:t>1/15/2021</a:t>
+              <a:t>1/16/2021</a:t>
             </a:fld>
             <a:endParaRPr lang="en-US"/>
           </a:p>
@@ -1405,7 +1405,7 @@
           <a:p>
             <a:fld id="{417597D8-38D3-4DD5-B14D-D63E9CCB29F9}" type="datetimeFigureOut">
               <a:rPr lang="en-US" smtClean="0"/>
-              <a:t>1/15/2021</a:t>
+              <a:t>1/16/2021</a:t>
             </a:fld>
             <a:endParaRPr lang="en-US"/>
           </a:p>
@@ -1817,7 +1817,7 @@
           <a:p>
             <a:fld id="{417597D8-38D3-4DD5-B14D-D63E9CCB29F9}" type="datetimeFigureOut">
               <a:rPr lang="en-US" smtClean="0"/>
-              <a:t>1/15/2021</a:t>
+              <a:t>1/16/2021</a:t>
             </a:fld>
             <a:endParaRPr lang="en-US"/>
           </a:p>
@@ -1958,7 +1958,7 @@
           <a:p>
             <a:fld id="{417597D8-38D3-4DD5-B14D-D63E9CCB29F9}" type="datetimeFigureOut">
               <a:rPr lang="en-US" smtClean="0"/>
-              <a:t>1/15/2021</a:t>
+              <a:t>1/16/2021</a:t>
             </a:fld>
             <a:endParaRPr lang="en-US"/>
           </a:p>
@@ -2071,7 +2071,7 @@
           <a:p>
             <a:fld id="{417597D8-38D3-4DD5-B14D-D63E9CCB29F9}" type="datetimeFigureOut">
               <a:rPr lang="en-US" smtClean="0"/>
-              <a:t>1/15/2021</a:t>
+              <a:t>1/16/2021</a:t>
             </a:fld>
             <a:endParaRPr lang="en-US"/>
           </a:p>
@@ -2382,7 +2382,7 @@
           <a:p>
             <a:fld id="{417597D8-38D3-4DD5-B14D-D63E9CCB29F9}" type="datetimeFigureOut">
               <a:rPr lang="en-US" smtClean="0"/>
-              <a:t>1/15/2021</a:t>
+              <a:t>1/16/2021</a:t>
             </a:fld>
             <a:endParaRPr lang="en-US"/>
           </a:p>
@@ -2670,7 +2670,7 @@
           <a:p>
             <a:fld id="{417597D8-38D3-4DD5-B14D-D63E9CCB29F9}" type="datetimeFigureOut">
               <a:rPr lang="en-US" smtClean="0"/>
-              <a:t>1/15/2021</a:t>
+              <a:t>1/16/2021</a:t>
             </a:fld>
             <a:endParaRPr lang="en-US"/>
           </a:p>
@@ -2911,7 +2911,7 @@
           <a:p>
             <a:fld id="{417597D8-38D3-4DD5-B14D-D63E9CCB29F9}" type="datetimeFigureOut">
               <a:rPr lang="en-US" smtClean="0"/>
-              <a:t>1/15/2021</a:t>
+              <a:t>1/16/2021</a:t>
             </a:fld>
             <a:endParaRPr lang="en-US"/>
           </a:p>
@@ -13988,6 +13988,451 @@
           </a:p>
         </p:txBody>
       </p:sp>
+      <p:sp>
+        <p:nvSpPr>
+          <p:cNvPr id="45" name="Oval 44">
+            <a:extLst>
+              <a:ext uri="{FF2B5EF4-FFF2-40B4-BE49-F238E27FC236}">
+                <a16:creationId xmlns:a16="http://schemas.microsoft.com/office/drawing/2014/main" id="{18DAE2EE-D42B-4A38-B901-A9E233F7127B}"/>
+              </a:ext>
+            </a:extLst>
+          </p:cNvPr>
+          <p:cNvSpPr/>
+          <p:nvPr/>
+        </p:nvSpPr>
+        <p:spPr>
+          <a:xfrm>
+            <a:off x="1086955" y="2768014"/>
+            <a:ext cx="365760" cy="365760"/>
+          </a:xfrm>
+          <a:prstGeom prst="ellipse">
+            <a:avLst/>
+          </a:prstGeom>
+          <a:solidFill>
+            <a:schemeClr val="tx1"/>
+          </a:solidFill>
+          <a:ln>
+            <a:noFill/>
+          </a:ln>
+        </p:spPr>
+        <p:style>
+          <a:lnRef idx="2">
+            <a:schemeClr val="accent1">
+              <a:shade val="50000"/>
+            </a:schemeClr>
+          </a:lnRef>
+          <a:fillRef idx="1">
+            <a:schemeClr val="accent1"/>
+          </a:fillRef>
+          <a:effectRef idx="0">
+            <a:schemeClr val="accent1"/>
+          </a:effectRef>
+          <a:fontRef idx="minor">
+            <a:schemeClr val="lt1"/>
+          </a:fontRef>
+        </p:style>
+        <p:txBody>
+          <a:bodyPr rtlCol="0" anchor="ctr"/>
+          <a:lstStyle/>
+          <a:p>
+            <a:pPr algn="ctr"/>
+            <a:r>
+              <a:rPr lang="en-US" sz="1600" dirty="0">
+                <a:latin typeface="+mj-lt"/>
+              </a:rPr>
+              <a:t>1</a:t>
+            </a:r>
+          </a:p>
+        </p:txBody>
+      </p:sp>
+      <p:sp>
+        <p:nvSpPr>
+          <p:cNvPr id="47" name="Oval 46">
+            <a:extLst>
+              <a:ext uri="{FF2B5EF4-FFF2-40B4-BE49-F238E27FC236}">
+                <a16:creationId xmlns:a16="http://schemas.microsoft.com/office/drawing/2014/main" id="{FFAE37C9-5B35-40D8-A36D-D58B1D60D1C6}"/>
+              </a:ext>
+            </a:extLst>
+          </p:cNvPr>
+          <p:cNvSpPr/>
+          <p:nvPr/>
+        </p:nvSpPr>
+        <p:spPr>
+          <a:xfrm>
+            <a:off x="4582483" y="2768014"/>
+            <a:ext cx="365760" cy="365760"/>
+          </a:xfrm>
+          <a:prstGeom prst="ellipse">
+            <a:avLst/>
+          </a:prstGeom>
+          <a:solidFill>
+            <a:schemeClr val="tx1"/>
+          </a:solidFill>
+          <a:ln>
+            <a:noFill/>
+          </a:ln>
+        </p:spPr>
+        <p:style>
+          <a:lnRef idx="2">
+            <a:schemeClr val="accent1">
+              <a:shade val="50000"/>
+            </a:schemeClr>
+          </a:lnRef>
+          <a:fillRef idx="1">
+            <a:schemeClr val="accent1"/>
+          </a:fillRef>
+          <a:effectRef idx="0">
+            <a:schemeClr val="accent1"/>
+          </a:effectRef>
+          <a:fontRef idx="minor">
+            <a:schemeClr val="lt1"/>
+          </a:fontRef>
+        </p:style>
+        <p:txBody>
+          <a:bodyPr rtlCol="0" anchor="ctr"/>
+          <a:lstStyle/>
+          <a:p>
+            <a:pPr algn="ctr"/>
+            <a:r>
+              <a:rPr lang="en-US" sz="1600" dirty="0">
+                <a:latin typeface="+mj-lt"/>
+              </a:rPr>
+              <a:t>2</a:t>
+            </a:r>
+          </a:p>
+        </p:txBody>
+      </p:sp>
+      <p:sp>
+        <p:nvSpPr>
+          <p:cNvPr id="49" name="Oval 48">
+            <a:extLst>
+              <a:ext uri="{FF2B5EF4-FFF2-40B4-BE49-F238E27FC236}">
+                <a16:creationId xmlns:a16="http://schemas.microsoft.com/office/drawing/2014/main" id="{8FA13F81-A2DD-442A-890C-D2B417A9A578}"/>
+              </a:ext>
+            </a:extLst>
+          </p:cNvPr>
+          <p:cNvSpPr/>
+          <p:nvPr/>
+        </p:nvSpPr>
+        <p:spPr>
+          <a:xfrm>
+            <a:off x="8544761" y="2767161"/>
+            <a:ext cx="365760" cy="365760"/>
+          </a:xfrm>
+          <a:prstGeom prst="ellipse">
+            <a:avLst/>
+          </a:prstGeom>
+          <a:solidFill>
+            <a:schemeClr val="tx1"/>
+          </a:solidFill>
+          <a:ln>
+            <a:noFill/>
+          </a:ln>
+        </p:spPr>
+        <p:style>
+          <a:lnRef idx="2">
+            <a:schemeClr val="accent1">
+              <a:shade val="50000"/>
+            </a:schemeClr>
+          </a:lnRef>
+          <a:fillRef idx="1">
+            <a:schemeClr val="accent1"/>
+          </a:fillRef>
+          <a:effectRef idx="0">
+            <a:schemeClr val="accent1"/>
+          </a:effectRef>
+          <a:fontRef idx="minor">
+            <a:schemeClr val="lt1"/>
+          </a:fontRef>
+        </p:style>
+        <p:txBody>
+          <a:bodyPr rtlCol="0" anchor="ctr"/>
+          <a:lstStyle/>
+          <a:p>
+            <a:pPr algn="ctr"/>
+            <a:r>
+              <a:rPr lang="en-US" sz="1600" dirty="0">
+                <a:latin typeface="+mj-lt"/>
+              </a:rPr>
+              <a:t>3</a:t>
+            </a:r>
+          </a:p>
+        </p:txBody>
+      </p:sp>
+      <p:sp>
+        <p:nvSpPr>
+          <p:cNvPr id="51" name="Oval 50">
+            <a:extLst>
+              <a:ext uri="{FF2B5EF4-FFF2-40B4-BE49-F238E27FC236}">
+                <a16:creationId xmlns:a16="http://schemas.microsoft.com/office/drawing/2014/main" id="{812AFC6E-2622-42EC-B055-01F3CF4B14A6}"/>
+              </a:ext>
+            </a:extLst>
+          </p:cNvPr>
+          <p:cNvSpPr/>
+          <p:nvPr/>
+        </p:nvSpPr>
+        <p:spPr>
+          <a:xfrm>
+            <a:off x="4582483" y="3841038"/>
+            <a:ext cx="365760" cy="365760"/>
+          </a:xfrm>
+          <a:prstGeom prst="ellipse">
+            <a:avLst/>
+          </a:prstGeom>
+          <a:solidFill>
+            <a:schemeClr val="tx1"/>
+          </a:solidFill>
+          <a:ln>
+            <a:noFill/>
+          </a:ln>
+        </p:spPr>
+        <p:style>
+          <a:lnRef idx="2">
+            <a:schemeClr val="accent1">
+              <a:shade val="50000"/>
+            </a:schemeClr>
+          </a:lnRef>
+          <a:fillRef idx="1">
+            <a:schemeClr val="accent1"/>
+          </a:fillRef>
+          <a:effectRef idx="0">
+            <a:schemeClr val="accent1"/>
+          </a:effectRef>
+          <a:fontRef idx="minor">
+            <a:schemeClr val="lt1"/>
+          </a:fontRef>
+        </p:style>
+        <p:txBody>
+          <a:bodyPr rtlCol="0" anchor="ctr"/>
+          <a:lstStyle/>
+          <a:p>
+            <a:pPr algn="ctr"/>
+            <a:r>
+              <a:rPr lang="en-US" sz="1600" dirty="0">
+                <a:latin typeface="+mj-lt"/>
+              </a:rPr>
+              <a:t>4</a:t>
+            </a:r>
+          </a:p>
+        </p:txBody>
+      </p:sp>
+      <p:sp>
+        <p:nvSpPr>
+          <p:cNvPr id="53" name="Oval 52">
+            <a:extLst>
+              <a:ext uri="{FF2B5EF4-FFF2-40B4-BE49-F238E27FC236}">
+                <a16:creationId xmlns:a16="http://schemas.microsoft.com/office/drawing/2014/main" id="{F0785BCE-F117-4693-ACF0-2543372A393F}"/>
+              </a:ext>
+            </a:extLst>
+          </p:cNvPr>
+          <p:cNvSpPr/>
+          <p:nvPr/>
+        </p:nvSpPr>
+        <p:spPr>
+          <a:xfrm>
+            <a:off x="8544761" y="5146743"/>
+            <a:ext cx="365760" cy="365760"/>
+          </a:xfrm>
+          <a:prstGeom prst="ellipse">
+            <a:avLst/>
+          </a:prstGeom>
+          <a:solidFill>
+            <a:schemeClr val="tx1"/>
+          </a:solidFill>
+          <a:ln>
+            <a:noFill/>
+          </a:ln>
+        </p:spPr>
+        <p:style>
+          <a:lnRef idx="2">
+            <a:schemeClr val="accent1">
+              <a:shade val="50000"/>
+            </a:schemeClr>
+          </a:lnRef>
+          <a:fillRef idx="1">
+            <a:schemeClr val="accent1"/>
+          </a:fillRef>
+          <a:effectRef idx="0">
+            <a:schemeClr val="accent1"/>
+          </a:effectRef>
+          <a:fontRef idx="minor">
+            <a:schemeClr val="lt1"/>
+          </a:fontRef>
+        </p:style>
+        <p:txBody>
+          <a:bodyPr rtlCol="0" anchor="ctr"/>
+          <a:lstStyle/>
+          <a:p>
+            <a:pPr algn="ctr"/>
+            <a:r>
+              <a:rPr lang="en-US" sz="1600" dirty="0">
+                <a:latin typeface="+mj-lt"/>
+              </a:rPr>
+              <a:t>5</a:t>
+            </a:r>
+          </a:p>
+        </p:txBody>
+      </p:sp>
+      <p:sp>
+        <p:nvSpPr>
+          <p:cNvPr id="55" name="Oval 54">
+            <a:extLst>
+              <a:ext uri="{FF2B5EF4-FFF2-40B4-BE49-F238E27FC236}">
+                <a16:creationId xmlns:a16="http://schemas.microsoft.com/office/drawing/2014/main" id="{E7A3EEEB-DEC1-42DF-95E0-405F930A4428}"/>
+              </a:ext>
+            </a:extLst>
+          </p:cNvPr>
+          <p:cNvSpPr/>
+          <p:nvPr/>
+        </p:nvSpPr>
+        <p:spPr>
+          <a:xfrm>
+            <a:off x="4601973" y="5146743"/>
+            <a:ext cx="365760" cy="365760"/>
+          </a:xfrm>
+          <a:prstGeom prst="ellipse">
+            <a:avLst/>
+          </a:prstGeom>
+          <a:solidFill>
+            <a:schemeClr val="tx1"/>
+          </a:solidFill>
+          <a:ln>
+            <a:noFill/>
+          </a:ln>
+        </p:spPr>
+        <p:style>
+          <a:lnRef idx="2">
+            <a:schemeClr val="accent1">
+              <a:shade val="50000"/>
+            </a:schemeClr>
+          </a:lnRef>
+          <a:fillRef idx="1">
+            <a:schemeClr val="accent1"/>
+          </a:fillRef>
+          <a:effectRef idx="0">
+            <a:schemeClr val="accent1"/>
+          </a:effectRef>
+          <a:fontRef idx="minor">
+            <a:schemeClr val="lt1"/>
+          </a:fontRef>
+        </p:style>
+        <p:txBody>
+          <a:bodyPr rtlCol="0" anchor="ctr"/>
+          <a:lstStyle/>
+          <a:p>
+            <a:pPr algn="ctr"/>
+            <a:r>
+              <a:rPr lang="en-US" sz="1600" dirty="0">
+                <a:latin typeface="+mj-lt"/>
+              </a:rPr>
+              <a:t>7</a:t>
+            </a:r>
+          </a:p>
+        </p:txBody>
+      </p:sp>
+      <p:cxnSp>
+        <p:nvCxnSpPr>
+          <p:cNvPr id="17" name="Straight Arrow Connector 16">
+            <a:extLst>
+              <a:ext uri="{FF2B5EF4-FFF2-40B4-BE49-F238E27FC236}">
+                <a16:creationId xmlns:a16="http://schemas.microsoft.com/office/drawing/2014/main" id="{361463CB-EA7A-4A83-A862-C99779DC5B71}"/>
+              </a:ext>
+            </a:extLst>
+          </p:cNvPr>
+          <p:cNvCxnSpPr>
+            <a:stCxn id="33" idx="0"/>
+            <a:endCxn id="25" idx="2"/>
+          </p:cNvCxnSpPr>
+          <p:nvPr/>
+        </p:nvCxnSpPr>
+        <p:spPr>
+          <a:xfrm flipV="1">
+            <a:off x="7774824" y="3303944"/>
+            <a:ext cx="0" cy="684461"/>
+          </a:xfrm>
+          <a:prstGeom prst="straightConnector1">
+            <a:avLst/>
+          </a:prstGeom>
+          <a:ln w="9525">
+            <a:solidFill>
+              <a:schemeClr val="tx1"/>
+            </a:solidFill>
+            <a:prstDash val="lgDash"/>
+            <a:tailEnd type="triangle"/>
+          </a:ln>
+        </p:spPr>
+        <p:style>
+          <a:lnRef idx="1">
+            <a:schemeClr val="accent1"/>
+          </a:lnRef>
+          <a:fillRef idx="0">
+            <a:schemeClr val="accent1"/>
+          </a:fillRef>
+          <a:effectRef idx="0">
+            <a:schemeClr val="accent1"/>
+          </a:effectRef>
+          <a:fontRef idx="minor">
+            <a:schemeClr val="tx1"/>
+          </a:fontRef>
+        </p:style>
+      </p:cxnSp>
+      <p:sp>
+        <p:nvSpPr>
+          <p:cNvPr id="59" name="Oval 58">
+            <a:extLst>
+              <a:ext uri="{FF2B5EF4-FFF2-40B4-BE49-F238E27FC236}">
+                <a16:creationId xmlns:a16="http://schemas.microsoft.com/office/drawing/2014/main" id="{2F453EA9-FF9F-4CEF-9812-E5F8C7477F7E}"/>
+              </a:ext>
+            </a:extLst>
+          </p:cNvPr>
+          <p:cNvSpPr/>
+          <p:nvPr/>
+        </p:nvSpPr>
+        <p:spPr>
+          <a:xfrm>
+            <a:off x="6645115" y="2767161"/>
+            <a:ext cx="365760" cy="365760"/>
+          </a:xfrm>
+          <a:prstGeom prst="ellipse">
+            <a:avLst/>
+          </a:prstGeom>
+          <a:solidFill>
+            <a:schemeClr val="tx1"/>
+          </a:solidFill>
+          <a:ln>
+            <a:noFill/>
+          </a:ln>
+        </p:spPr>
+        <p:style>
+          <a:lnRef idx="2">
+            <a:schemeClr val="accent1">
+              <a:shade val="50000"/>
+            </a:schemeClr>
+          </a:lnRef>
+          <a:fillRef idx="1">
+            <a:schemeClr val="accent1"/>
+          </a:fillRef>
+          <a:effectRef idx="0">
+            <a:schemeClr val="accent1"/>
+          </a:effectRef>
+          <a:fontRef idx="minor">
+            <a:schemeClr val="lt1"/>
+          </a:fontRef>
+        </p:style>
+        <p:txBody>
+          <a:bodyPr rtlCol="0" anchor="ctr"/>
+          <a:lstStyle/>
+          <a:p>
+            <a:pPr algn="ctr"/>
+            <a:r>
+              <a:rPr lang="en-US" sz="1600" dirty="0">
+                <a:latin typeface="+mj-lt"/>
+              </a:rPr>
+              <a:t>6</a:t>
+            </a:r>
+          </a:p>
+        </p:txBody>
+      </p:sp>
     </p:spTree>
     <p:extLst>
       <p:ext uri="{BB962C8B-B14F-4D97-AF65-F5344CB8AC3E}">

</xml_diff>